<commit_message>
adding ex1 xhtml output to slide
</commit_message>
<xml_diff>
--- a/src/chase_analysis/vc/cost_first_attempt.pptx
+++ b/src/chase_analysis/vc/cost_first_attempt.pptx
@@ -6,6 +6,7 @@
   </p:sldMasterIdLst>
   <p:sldIdLst>
     <p:sldId id="256" r:id="rId2"/>
+    <p:sldId id="257" r:id="rId3"/>
   </p:sldIdLst>
   <p:sldSz cx="12192000" cy="6858000"/>
   <p:notesSz cx="6858000" cy="9144000"/>
@@ -3555,6 +3556,138 @@
 </p:sld>
 </file>
 
+<file path=ppt/slides/slide2.xml><?xml version="1.0" encoding="utf-8"?>
+<p:sld xmlns:a="http://schemas.openxmlformats.org/drawingml/2006/main" xmlns:r="http://schemas.openxmlformats.org/officeDocument/2006/relationships" xmlns:p="http://schemas.openxmlformats.org/presentationml/2006/main">
+  <p:cSld>
+    <p:spTree>
+      <p:nvGrpSpPr>
+        <p:cNvPr id="1" name=""/>
+        <p:cNvGrpSpPr/>
+        <p:nvPr/>
+      </p:nvGrpSpPr>
+      <p:grpSpPr>
+        <a:xfrm>
+          <a:off x="0" y="0"/>
+          <a:ext cx="0" cy="0"/>
+          <a:chOff x="0" y="0"/>
+          <a:chExt cx="0" cy="0"/>
+        </a:xfrm>
+      </p:grpSpPr>
+      <p:sp>
+        <p:nvSpPr>
+          <p:cNvPr id="2" name="Title 1">
+            <a:extLst>
+              <a:ext uri="{FF2B5EF4-FFF2-40B4-BE49-F238E27FC236}">
+                <a16:creationId xmlns:a16="http://schemas.microsoft.com/office/drawing/2014/main" id="{FB3DEA3D-E22B-68D0-503E-54ED19A35A25}"/>
+              </a:ext>
+            </a:extLst>
+          </p:cNvPr>
+          <p:cNvSpPr>
+            <a:spLocks noGrp="1"/>
+          </p:cNvSpPr>
+          <p:nvPr>
+            <p:ph type="title"/>
+          </p:nvPr>
+        </p:nvSpPr>
+        <p:spPr/>
+        <p:txBody>
+          <a:bodyPr/>
+          <a:lstStyle/>
+          <a:p>
+            <a:r>
+              <a:rPr lang="en-US" u="sng" dirty="0"/>
+              <a:t>First protocol…. Just measure virus checker</a:t>
+            </a:r>
+          </a:p>
+        </p:txBody>
+      </p:sp>
+      <p:sp>
+        <p:nvSpPr>
+          <p:cNvPr id="3" name="Content Placeholder 2">
+            <a:extLst>
+              <a:ext uri="{FF2B5EF4-FFF2-40B4-BE49-F238E27FC236}">
+                <a16:creationId xmlns:a16="http://schemas.microsoft.com/office/drawing/2014/main" id="{7077FB2C-FDAD-921B-974C-F66BF2FF3855}"/>
+              </a:ext>
+            </a:extLst>
+          </p:cNvPr>
+          <p:cNvSpPr>
+            <a:spLocks noGrp="1"/>
+          </p:cNvSpPr>
+          <p:nvPr>
+            <p:ph idx="1"/>
+          </p:nvPr>
+        </p:nvSpPr>
+        <p:spPr>
+          <a:xfrm>
+            <a:off x="838200" y="1825625"/>
+            <a:ext cx="5257800" cy="4351338"/>
+          </a:xfrm>
+        </p:spPr>
+        <p:txBody>
+          <a:bodyPr/>
+          <a:lstStyle/>
+          <a:p>
+            <a:r>
+              <a:rPr lang="en-US" dirty="0"/>
+              <a:t>I have no idea what I’m doing with </a:t>
+            </a:r>
+            <a:r>
+              <a:rPr lang="en-US"/>
+              <a:t>problem configuration</a:t>
+            </a:r>
+            <a:endParaRPr lang="en-US" dirty="0"/>
+          </a:p>
+          <a:p>
+            <a:r>
+              <a:rPr lang="en-US" dirty="0"/>
+              <a:t>Model doesn’t show anything interesting…  </a:t>
+            </a:r>
+          </a:p>
+        </p:txBody>
+      </p:sp>
+      <p:pic>
+        <p:nvPicPr>
+          <p:cNvPr id="4" name="Picture 3">
+            <a:extLst>
+              <a:ext uri="{FF2B5EF4-FFF2-40B4-BE49-F238E27FC236}">
+                <a16:creationId xmlns:a16="http://schemas.microsoft.com/office/drawing/2014/main" id="{D43EC390-8736-C338-EAC4-BF26510A8EF5}"/>
+              </a:ext>
+            </a:extLst>
+          </p:cNvPr>
+          <p:cNvPicPr>
+            <a:picLocks noChangeAspect="1"/>
+          </p:cNvPicPr>
+          <p:nvPr/>
+        </p:nvPicPr>
+        <p:blipFill>
+          <a:blip r:embed="rId2"/>
+          <a:stretch>
+            <a:fillRect/>
+          </a:stretch>
+        </p:blipFill>
+        <p:spPr>
+          <a:xfrm>
+            <a:off x="7008585" y="1909632"/>
+            <a:ext cx="4345215" cy="4678040"/>
+          </a:xfrm>
+          <a:prstGeom prst="rect">
+            <a:avLst/>
+          </a:prstGeom>
+        </p:spPr>
+      </p:pic>
+    </p:spTree>
+    <p:extLst>
+      <p:ext uri="{BB962C8B-B14F-4D97-AF65-F5344CB8AC3E}">
+        <p14:creationId xmlns:p14="http://schemas.microsoft.com/office/powerpoint/2010/main" val="2808268561"/>
+      </p:ext>
+    </p:extLst>
+  </p:cSld>
+  <p:clrMapOvr>
+    <a:masterClrMapping/>
+  </p:clrMapOvr>
+</p:sld>
+</file>
+
 <file path=ppt/theme/theme1.xml><?xml version="1.0" encoding="utf-8"?>
 <a:theme xmlns:a="http://schemas.openxmlformats.org/drawingml/2006/main" name="Office Theme">
   <a:themeElements>

</xml_diff>